<commit_message>
Move more documentation to the ROS wiki
</commit_message>
<xml_diff>
--- a/docs/teleop_joy_source.pptx
+++ b/docs/teleop_joy_source.pptx
@@ -193,7 +193,7 @@
           <a:p>
             <a:fld id="{5913568A-2F08-CE46-B15D-C1D8AE7093E1}" type="datetimeFigureOut">
               <a:rPr lang="en-US" smtClean="0"/>
-              <a:t>2/1/16</a:t>
+              <a:t>2/2/16</a:t>
             </a:fld>
             <a:endParaRPr lang="en-US"/>
           </a:p>
@@ -818,7 +818,7 @@
           <a:p>
             <a:fld id="{BD0EEA0D-6C07-E04C-921A-83F3A9B4F76F}" type="datetimeFigureOut">
               <a:rPr lang="en-US" smtClean="0"/>
-              <a:t>2/1/16</a:t>
+              <a:t>2/2/16</a:t>
             </a:fld>
             <a:endParaRPr lang="en-US"/>
           </a:p>
@@ -988,7 +988,7 @@
           <a:p>
             <a:fld id="{BD0EEA0D-6C07-E04C-921A-83F3A9B4F76F}" type="datetimeFigureOut">
               <a:rPr lang="en-US" smtClean="0"/>
-              <a:t>2/1/16</a:t>
+              <a:t>2/2/16</a:t>
             </a:fld>
             <a:endParaRPr lang="en-US"/>
           </a:p>
@@ -1168,7 +1168,7 @@
           <a:p>
             <a:fld id="{BD0EEA0D-6C07-E04C-921A-83F3A9B4F76F}" type="datetimeFigureOut">
               <a:rPr lang="en-US" smtClean="0"/>
-              <a:t>2/1/16</a:t>
+              <a:t>2/2/16</a:t>
             </a:fld>
             <a:endParaRPr lang="en-US"/>
           </a:p>
@@ -1338,7 +1338,7 @@
           <a:p>
             <a:fld id="{BD0EEA0D-6C07-E04C-921A-83F3A9B4F76F}" type="datetimeFigureOut">
               <a:rPr lang="en-US" smtClean="0"/>
-              <a:t>2/1/16</a:t>
+              <a:t>2/2/16</a:t>
             </a:fld>
             <a:endParaRPr lang="en-US"/>
           </a:p>
@@ -1584,7 +1584,7 @@
           <a:p>
             <a:fld id="{BD0EEA0D-6C07-E04C-921A-83F3A9B4F76F}" type="datetimeFigureOut">
               <a:rPr lang="en-US" smtClean="0"/>
-              <a:t>2/1/16</a:t>
+              <a:t>2/2/16</a:t>
             </a:fld>
             <a:endParaRPr lang="en-US"/>
           </a:p>
@@ -1872,7 +1872,7 @@
           <a:p>
             <a:fld id="{BD0EEA0D-6C07-E04C-921A-83F3A9B4F76F}" type="datetimeFigureOut">
               <a:rPr lang="en-US" smtClean="0"/>
-              <a:t>2/1/16</a:t>
+              <a:t>2/2/16</a:t>
             </a:fld>
             <a:endParaRPr lang="en-US"/>
           </a:p>
@@ -2294,7 +2294,7 @@
           <a:p>
             <a:fld id="{BD0EEA0D-6C07-E04C-921A-83F3A9B4F76F}" type="datetimeFigureOut">
               <a:rPr lang="en-US" smtClean="0"/>
-              <a:t>2/1/16</a:t>
+              <a:t>2/2/16</a:t>
             </a:fld>
             <a:endParaRPr lang="en-US"/>
           </a:p>
@@ -2412,7 +2412,7 @@
           <a:p>
             <a:fld id="{BD0EEA0D-6C07-E04C-921A-83F3A9B4F76F}" type="datetimeFigureOut">
               <a:rPr lang="en-US" smtClean="0"/>
-              <a:t>2/1/16</a:t>
+              <a:t>2/2/16</a:t>
             </a:fld>
             <a:endParaRPr lang="en-US"/>
           </a:p>
@@ -2507,7 +2507,7 @@
           <a:p>
             <a:fld id="{BD0EEA0D-6C07-E04C-921A-83F3A9B4F76F}" type="datetimeFigureOut">
               <a:rPr lang="en-US" smtClean="0"/>
-              <a:t>2/1/16</a:t>
+              <a:t>2/2/16</a:t>
             </a:fld>
             <a:endParaRPr lang="en-US"/>
           </a:p>
@@ -2784,7 +2784,7 @@
           <a:p>
             <a:fld id="{BD0EEA0D-6C07-E04C-921A-83F3A9B4F76F}" type="datetimeFigureOut">
               <a:rPr lang="en-US" smtClean="0"/>
-              <a:t>2/1/16</a:t>
+              <a:t>2/2/16</a:t>
             </a:fld>
             <a:endParaRPr lang="en-US"/>
           </a:p>
@@ -3037,7 +3037,7 @@
           <a:p>
             <a:fld id="{BD0EEA0D-6C07-E04C-921A-83F3A9B4F76F}" type="datetimeFigureOut">
               <a:rPr lang="en-US" smtClean="0"/>
-              <a:t>2/1/16</a:t>
+              <a:t>2/2/16</a:t>
             </a:fld>
             <a:endParaRPr lang="en-US"/>
           </a:p>
@@ -3250,7 +3250,7 @@
           <a:p>
             <a:fld id="{BD0EEA0D-6C07-E04C-921A-83F3A9B4F76F}" type="datetimeFigureOut">
               <a:rPr lang="en-US" smtClean="0"/>
-              <a:t>2/1/16</a:t>
+              <a:t>2/2/16</a:t>
             </a:fld>
             <a:endParaRPr lang="en-US"/>
           </a:p>
@@ -3707,7 +3707,7 @@
             <a:pPr algn="r"/>
             <a:r>
               <a:rPr lang="en-US" sz="1200" dirty="0" smtClean="0"/>
-              <a:t>land</a:t>
+              <a:t>disarm</a:t>
             </a:r>
           </a:p>
         </p:txBody>
@@ -3720,8 +3720,8 @@
         </p:nvSpPr>
         <p:spPr>
           <a:xfrm>
-            <a:off x="316987" y="1757269"/>
-            <a:ext cx="2011680" cy="276999"/>
+            <a:off x="228177" y="2246782"/>
+            <a:ext cx="2011680" cy="461665"/>
           </a:xfrm>
           <a:prstGeom prst="rect">
             <a:avLst/>
@@ -3739,19 +3739,25 @@
               <a:rPr lang="en-US" sz="1200" dirty="0" smtClean="0"/>
               <a:t>translate forward/backward</a:t>
             </a:r>
-            <a:endParaRPr lang="en-US" sz="1200" dirty="0" smtClean="0"/>
-          </a:p>
-        </p:txBody>
-      </p:sp>
-      <p:sp>
-        <p:nvSpPr>
-          <p:cNvPr id="16" name="TextBox 15"/>
+          </a:p>
+          <a:p>
+            <a:pPr algn="r"/>
+            <a:r>
+              <a:rPr lang="en-US" sz="1200" dirty="0" smtClean="0"/>
+              <a:t>translate left/right</a:t>
+            </a:r>
+          </a:p>
+        </p:txBody>
+      </p:sp>
+      <p:sp>
+        <p:nvSpPr>
+          <p:cNvPr id="22" name="TextBox 21"/>
           <p:cNvSpPr txBox="1"/>
           <p:nvPr/>
         </p:nvSpPr>
         <p:spPr>
           <a:xfrm>
-            <a:off x="221497" y="2246782"/>
+            <a:off x="30517" y="3715321"/>
             <a:ext cx="2011680" cy="276999"/>
           </a:xfrm>
           <a:prstGeom prst="rect">
@@ -3768,20 +3774,21 @@
             <a:pPr algn="r"/>
             <a:r>
               <a:rPr lang="en-US" sz="1200" dirty="0" smtClean="0"/>
-              <a:t>turn left/right</a:t>
-            </a:r>
-          </a:p>
-        </p:txBody>
-      </p:sp>
-      <p:sp>
-        <p:nvSpPr>
-          <p:cNvPr id="22" name="TextBox 21"/>
+              <a:t>tilt camera up</a:t>
+            </a:r>
+            <a:endParaRPr lang="en-US" sz="1200" dirty="0"/>
+          </a:p>
+        </p:txBody>
+      </p:sp>
+      <p:sp>
+        <p:nvSpPr>
+          <p:cNvPr id="24" name="TextBox 23"/>
           <p:cNvSpPr txBox="1"/>
           <p:nvPr/>
         </p:nvSpPr>
         <p:spPr>
           <a:xfrm>
-            <a:off x="30517" y="3715321"/>
+            <a:off x="30517" y="4204834"/>
             <a:ext cx="2011680" cy="276999"/>
           </a:xfrm>
           <a:prstGeom prst="rect">
@@ -3798,21 +3805,20 @@
             <a:pPr algn="r"/>
             <a:r>
               <a:rPr lang="en-US" sz="1200" dirty="0" smtClean="0"/>
-              <a:t>tilt camera up</a:t>
-            </a:r>
-            <a:endParaRPr lang="en-US" sz="1200" dirty="0"/>
-          </a:p>
-        </p:txBody>
-      </p:sp>
-      <p:sp>
-        <p:nvSpPr>
-          <p:cNvPr id="24" name="TextBox 23"/>
+              <a:t>tilt camera down </a:t>
+            </a:r>
+          </a:p>
+        </p:txBody>
+      </p:sp>
+      <p:sp>
+        <p:nvSpPr>
+          <p:cNvPr id="52" name="TextBox 51"/>
           <p:cNvSpPr txBox="1"/>
           <p:nvPr/>
         </p:nvSpPr>
         <p:spPr>
           <a:xfrm>
-            <a:off x="30517" y="4204834"/>
+            <a:off x="6719843" y="1272142"/>
             <a:ext cx="2011680" cy="276999"/>
           </a:xfrm>
           <a:prstGeom prst="rect">
@@ -3826,23 +3832,22 @@
           </a:bodyPr>
           <a:lstStyle/>
           <a:p>
-            <a:pPr algn="r"/>
             <a:r>
               <a:rPr lang="en-US" sz="1200" dirty="0" smtClean="0"/>
-              <a:t>tilt camera down </a:t>
-            </a:r>
-          </a:p>
-        </p:txBody>
-      </p:sp>
-      <p:sp>
-        <p:nvSpPr>
-          <p:cNvPr id="52" name="TextBox 51"/>
+              <a:t>arm</a:t>
+            </a:r>
+          </a:p>
+        </p:txBody>
+      </p:sp>
+      <p:sp>
+        <p:nvSpPr>
+          <p:cNvPr id="53" name="TextBox 52"/>
           <p:cNvSpPr txBox="1"/>
           <p:nvPr/>
         </p:nvSpPr>
         <p:spPr>
           <a:xfrm>
-            <a:off x="6719843" y="1272142"/>
+            <a:off x="6815333" y="1757269"/>
             <a:ext cx="2011680" cy="276999"/>
           </a:xfrm>
           <a:prstGeom prst="rect">
@@ -3858,20 +3863,20 @@
           <a:p>
             <a:r>
               <a:rPr lang="en-US" sz="1200" dirty="0" smtClean="0"/>
-              <a:t>takeoff</a:t>
-            </a:r>
-          </a:p>
-        </p:txBody>
-      </p:sp>
-      <p:sp>
-        <p:nvSpPr>
-          <p:cNvPr id="53" name="TextBox 52"/>
+              <a:t>alt_hold</a:t>
+            </a:r>
+          </a:p>
+        </p:txBody>
+      </p:sp>
+      <p:sp>
+        <p:nvSpPr>
+          <p:cNvPr id="54" name="TextBox 53"/>
           <p:cNvSpPr txBox="1"/>
           <p:nvPr/>
         </p:nvSpPr>
         <p:spPr>
           <a:xfrm>
-            <a:off x="6815333" y="1757269"/>
+            <a:off x="6910823" y="2246782"/>
             <a:ext cx="2011680" cy="276999"/>
           </a:xfrm>
           <a:prstGeom prst="rect">
@@ -3887,21 +3892,20 @@
           <a:p>
             <a:r>
               <a:rPr lang="en-US" sz="1200" dirty="0" smtClean="0"/>
-              <a:t>alt_hold</a:t>
-            </a:r>
-            <a:endParaRPr lang="en-US" sz="1200" dirty="0" smtClean="0"/>
-          </a:p>
-        </p:txBody>
-      </p:sp>
-      <p:sp>
-        <p:nvSpPr>
-          <p:cNvPr id="54" name="TextBox 53"/>
+              <a:t>stabilize</a:t>
+            </a:r>
+          </a:p>
+        </p:txBody>
+      </p:sp>
+      <p:sp>
+        <p:nvSpPr>
+          <p:cNvPr id="55" name="TextBox 54"/>
           <p:cNvSpPr txBox="1"/>
           <p:nvPr/>
         </p:nvSpPr>
         <p:spPr>
           <a:xfrm>
-            <a:off x="6910823" y="2246782"/>
+            <a:off x="7072463" y="2959815"/>
             <a:ext cx="2011680" cy="276999"/>
           </a:xfrm>
           <a:prstGeom prst="rect">
@@ -3917,20 +3921,21 @@
           <a:p>
             <a:r>
               <a:rPr lang="en-US" sz="1200" dirty="0" smtClean="0"/>
-              <a:t>stabilize</a:t>
-            </a:r>
-          </a:p>
-        </p:txBody>
-      </p:sp>
-      <p:sp>
-        <p:nvSpPr>
-          <p:cNvPr id="55" name="TextBox 54"/>
+              <a:t>land</a:t>
+            </a:r>
+            <a:endParaRPr lang="en-US" sz="1200" dirty="0"/>
+          </a:p>
+        </p:txBody>
+      </p:sp>
+      <p:sp>
+        <p:nvSpPr>
+          <p:cNvPr id="56" name="TextBox 55"/>
           <p:cNvSpPr txBox="1"/>
           <p:nvPr/>
         </p:nvSpPr>
         <p:spPr>
           <a:xfrm>
-            <a:off x="7006313" y="2736295"/>
+            <a:off x="7101803" y="3449328"/>
             <a:ext cx="2011680" cy="276999"/>
           </a:xfrm>
           <a:prstGeom prst="rect">
@@ -3946,7 +3951,7 @@
           <a:p>
             <a:r>
               <a:rPr lang="en-US" sz="1200" dirty="0" smtClean="0"/>
-              <a:t>disarm</a:t>
+              <a:t>takeoff</a:t>
             </a:r>
             <a:endParaRPr lang="en-US" sz="1200" dirty="0"/>
           </a:p>
@@ -3954,14 +3959,14 @@
       </p:sp>
       <p:sp>
         <p:nvSpPr>
-          <p:cNvPr id="56" name="TextBox 55"/>
+          <p:cNvPr id="58" name="TextBox 57"/>
           <p:cNvSpPr txBox="1"/>
           <p:nvPr/>
         </p:nvSpPr>
         <p:spPr>
           <a:xfrm>
-            <a:off x="7101803" y="3225808"/>
-            <a:ext cx="2011680" cy="276999"/>
+            <a:off x="7101803" y="4204834"/>
+            <a:ext cx="2011680" cy="461665"/>
           </a:xfrm>
           <a:prstGeom prst="rect">
             <a:avLst/>
@@ -3975,68 +3980,14 @@
           <a:lstStyle/>
           <a:p>
             <a:r>
-              <a:rPr lang="en-US" sz="1200" dirty="0" smtClean="0"/>
-              <a:t>arm</a:t>
-            </a:r>
-            <a:endParaRPr lang="en-US" sz="1200" dirty="0"/>
-          </a:p>
-        </p:txBody>
-      </p:sp>
-      <p:sp>
-        <p:nvSpPr>
-          <p:cNvPr id="57" name="TextBox 56"/>
-          <p:cNvSpPr txBox="1"/>
-          <p:nvPr/>
-        </p:nvSpPr>
-        <p:spPr>
-          <a:xfrm>
-            <a:off x="7101803" y="3715321"/>
-            <a:ext cx="2011680" cy="276999"/>
-          </a:xfrm>
-          <a:prstGeom prst="rect">
-            <a:avLst/>
-          </a:prstGeom>
-          <a:noFill/>
-        </p:spPr>
-        <p:txBody>
-          <a:bodyPr wrap="square" rtlCol="0">
-            <a:spAutoFit/>
-          </a:bodyPr>
-          <a:lstStyle/>
-          <a:p>
-            <a:r>
-              <a:rPr lang="en-US" sz="1200" dirty="0" smtClean="0"/>
+              <a:rPr lang="en-US" sz="1200" dirty="0"/>
               <a:t>translate up/down</a:t>
             </a:r>
-            <a:endParaRPr lang="en-US" sz="1200" dirty="0"/>
-          </a:p>
-        </p:txBody>
-      </p:sp>
-      <p:sp>
-        <p:nvSpPr>
-          <p:cNvPr id="58" name="TextBox 57"/>
-          <p:cNvSpPr txBox="1"/>
-          <p:nvPr/>
-        </p:nvSpPr>
-        <p:spPr>
-          <a:xfrm>
-            <a:off x="7101803" y="4204834"/>
-            <a:ext cx="2011680" cy="276999"/>
-          </a:xfrm>
-          <a:prstGeom prst="rect">
-            <a:avLst/>
-          </a:prstGeom>
-          <a:noFill/>
-        </p:spPr>
-        <p:txBody>
-          <a:bodyPr wrap="square" rtlCol="0">
-            <a:spAutoFit/>
-          </a:bodyPr>
-          <a:lstStyle/>
-          <a:p>
-            <a:r>
-              <a:rPr lang="en-US" sz="1200" dirty="0" smtClean="0"/>
-              <a:t>translate left/right</a:t>
+          </a:p>
+          <a:p>
+            <a:r>
+              <a:rPr lang="en-US" sz="1200" dirty="0"/>
+              <a:t>rotate left/right</a:t>
             </a:r>
           </a:p>
         </p:txBody>
@@ -4051,41 +4002,8 @@
         </p:nvCxnSpPr>
         <p:spPr>
           <a:xfrm>
-            <a:off x="2328667" y="1895769"/>
-            <a:ext cx="897228" cy="460515"/>
-          </a:xfrm>
-          <a:prstGeom prst="line">
-            <a:avLst/>
-          </a:prstGeom>
-          <a:ln w="12700" cmpd="sng"/>
-        </p:spPr>
-        <p:style>
-          <a:lnRef idx="2">
-            <a:schemeClr val="dk1"/>
-          </a:lnRef>
-          <a:fillRef idx="0">
-            <a:schemeClr val="dk1"/>
-          </a:fillRef>
-          <a:effectRef idx="1">
-            <a:schemeClr val="dk1"/>
-          </a:effectRef>
-          <a:fontRef idx="minor">
-            <a:schemeClr val="tx1"/>
-          </a:fontRef>
-        </p:style>
-      </p:cxnSp>
-      <p:cxnSp>
-        <p:nvCxnSpPr>
-          <p:cNvPr id="63" name="Straight Connector 62"/>
-          <p:cNvCxnSpPr>
-            <a:stCxn id="16" idx="3"/>
-          </p:cNvCxnSpPr>
-          <p:nvPr/>
-        </p:nvCxnSpPr>
-        <p:spPr>
-          <a:xfrm>
-            <a:off x="2233177" y="2385282"/>
-            <a:ext cx="805298" cy="144778"/>
+            <a:off x="2239857" y="2477615"/>
+            <a:ext cx="795443" cy="52927"/>
           </a:xfrm>
           <a:prstGeom prst="line">
             <a:avLst/>
@@ -4183,41 +4101,8 @@
         </p:nvCxnSpPr>
         <p:spPr>
           <a:xfrm>
-            <a:off x="5394972" y="3330958"/>
-            <a:ext cx="1706831" cy="1012376"/>
-          </a:xfrm>
-          <a:prstGeom prst="line">
-            <a:avLst/>
-          </a:prstGeom>
-          <a:ln w="12700" cmpd="sng"/>
-        </p:spPr>
-        <p:style>
-          <a:lnRef idx="2">
-            <a:schemeClr val="dk1"/>
-          </a:lnRef>
-          <a:fillRef idx="0">
-            <a:schemeClr val="dk1"/>
-          </a:fillRef>
-          <a:effectRef idx="1">
-            <a:schemeClr val="dk1"/>
-          </a:effectRef>
-          <a:fontRef idx="minor">
-            <a:schemeClr val="tx1"/>
-          </a:fontRef>
-        </p:style>
-      </p:cxnSp>
-      <p:cxnSp>
-        <p:nvCxnSpPr>
-          <p:cNvPr id="67" name="Straight Connector 66"/>
-          <p:cNvCxnSpPr>
-            <a:endCxn id="57" idx="1"/>
-          </p:cNvCxnSpPr>
-          <p:nvPr/>
-        </p:nvCxnSpPr>
-        <p:spPr>
-          <a:xfrm>
-            <a:off x="5213548" y="3151990"/>
-            <a:ext cx="1888255" cy="701831"/>
+            <a:off x="5391481" y="3333750"/>
+            <a:ext cx="1710322" cy="1101917"/>
           </a:xfrm>
           <a:prstGeom prst="line">
             <a:avLst/>
@@ -4249,8 +4134,8 @@
         </p:nvCxnSpPr>
         <p:spPr>
           <a:xfrm>
-            <a:off x="5989072" y="2910897"/>
-            <a:ext cx="1112731" cy="453411"/>
+            <a:off x="5989072" y="2959815"/>
+            <a:ext cx="1112731" cy="628013"/>
           </a:xfrm>
           <a:prstGeom prst="line">
             <a:avLst/>
@@ -4276,14 +4161,14 @@
         <p:nvCxnSpPr>
           <p:cNvPr id="69" name="Straight Connector 68"/>
           <p:cNvCxnSpPr>
-            <a:endCxn id="55" idx="1"/>
+            <a:endCxn id="54" idx="1"/>
           </p:cNvCxnSpPr>
           <p:nvPr/>
         </p:nvCxnSpPr>
         <p:spPr>
-          <a:xfrm>
-            <a:off x="6343494" y="2565454"/>
-            <a:ext cx="662819" cy="309341"/>
+          <a:xfrm flipV="1">
+            <a:off x="6343494" y="2385282"/>
+            <a:ext cx="567329" cy="180172"/>
           </a:xfrm>
           <a:prstGeom prst="line">
             <a:avLst/>
@@ -4309,14 +4194,14 @@
         <p:nvCxnSpPr>
           <p:cNvPr id="70" name="Straight Connector 69"/>
           <p:cNvCxnSpPr>
-            <a:endCxn id="54" idx="1"/>
+            <a:endCxn id="55" idx="1"/>
           </p:cNvCxnSpPr>
           <p:nvPr/>
         </p:nvCxnSpPr>
         <p:spPr>
-          <a:xfrm flipV="1">
-            <a:off x="5610598" y="2385282"/>
-            <a:ext cx="1300225" cy="180172"/>
+          <a:xfrm>
+            <a:off x="5647109" y="2575914"/>
+            <a:ext cx="1425354" cy="522401"/>
           </a:xfrm>
           <a:prstGeom prst="line">
             <a:avLst/>
@@ -4348,8 +4233,8 @@
         </p:nvCxnSpPr>
         <p:spPr>
           <a:xfrm flipV="1">
-            <a:off x="5957435" y="1895769"/>
-            <a:ext cx="857898" cy="312664"/>
+            <a:off x="5989072" y="1895769"/>
+            <a:ext cx="826261" cy="301134"/>
           </a:xfrm>
           <a:prstGeom prst="line">
             <a:avLst/>

</xml_diff>